<commit_message>
Add a slide with the code quality
</commit_message>
<xml_diff>
--- a/Presentations/Sprint #4 Demo Presentation.pptx
+++ b/Presentations/Sprint #4 Demo Presentation.pptx
@@ -7,13 +7,14 @@
   <p:sldIdLst>
     <p:sldId id="256" r:id="rId2"/>
     <p:sldId id="257" r:id="rId3"/>
-    <p:sldId id="258" r:id="rId4"/>
-    <p:sldId id="259" r:id="rId5"/>
-    <p:sldId id="260" r:id="rId6"/>
-    <p:sldId id="261" r:id="rId7"/>
-    <p:sldId id="262" r:id="rId8"/>
-    <p:sldId id="263" r:id="rId9"/>
-    <p:sldId id="264" r:id="rId10"/>
+    <p:sldId id="265" r:id="rId4"/>
+    <p:sldId id="258" r:id="rId5"/>
+    <p:sldId id="259" r:id="rId6"/>
+    <p:sldId id="260" r:id="rId7"/>
+    <p:sldId id="261" r:id="rId8"/>
+    <p:sldId id="262" r:id="rId9"/>
+    <p:sldId id="263" r:id="rId10"/>
+    <p:sldId id="264" r:id="rId11"/>
   </p:sldIdLst>
   <p:sldSz cx="12192000" cy="6858000"/>
   <p:notesSz cx="6858000" cy="9144000"/>
@@ -112,6 +113,11 @@
       </a:defRPr>
     </a:lvl9pPr>
   </p:defaultTextStyle>
+  <p:extLst>
+    <p:ext uri="{EFAFB233-063F-42B5-8137-9DF3F51BA10A}">
+      <p15:sldGuideLst xmlns:p15="http://schemas.microsoft.com/office/powerpoint/2012/main"/>
+    </p:ext>
+  </p:extLst>
 </p:presentation>
 </file>
 
@@ -3414,264 +3420,7 @@
 </p:sld>
 </file>
 
-<file path=ppt/slides/slide2.xml><?xml version="1.0" encoding="utf-8"?>
-<p:sld xmlns:a="http://schemas.openxmlformats.org/drawingml/2006/main" xmlns:r="http://schemas.openxmlformats.org/officeDocument/2006/relationships" xmlns:p="http://schemas.openxmlformats.org/presentationml/2006/main">
-  <p:cSld>
-    <p:bg>
-      <p:bgPr>
-        <a:solidFill>
-          <a:schemeClr val="bg1"/>
-        </a:solidFill>
-        <a:effectLst/>
-      </p:bgPr>
-    </p:bg>
-    <p:spTree>
-      <p:nvGrpSpPr>
-        <p:cNvPr id="1" name=""/>
-        <p:cNvGrpSpPr/>
-        <p:nvPr/>
-      </p:nvGrpSpPr>
-      <p:grpSpPr>
-        <a:xfrm>
-          <a:off x="0" y="0"/>
-          <a:ext cx="0" cy="0"/>
-          <a:chOff x="0" y="0"/>
-          <a:chExt cx="0" cy="0"/>
-        </a:xfrm>
-      </p:grpSpPr>
-      <p:sp>
-        <p:nvSpPr>
-          <p:cNvPr id="40" name="Rectangle 7">
-            <a:extLst>
-              <a:ext uri="{FF2B5EF4-FFF2-40B4-BE49-F238E27FC236}">
-                <a16:creationId xmlns:a16="http://schemas.microsoft.com/office/drawing/2014/main" id="{8D70B121-56F4-4848-B38B-182089D909FA}"/>
-              </a:ext>
-              <a:ext uri="{C183D7F6-B498-43B3-948B-1728B52AA6E4}">
-                <adec:decorative xmlns:adec="http://schemas.microsoft.com/office/drawing/2017/decorative" val="1"/>
-              </a:ext>
-            </a:extLst>
-          </p:cNvPr>
-          <p:cNvSpPr>
-            <a:spLocks noGrp="1" noRot="1" noChangeAspect="1" noMove="1" noResize="1" noEditPoints="1" noAdjustHandles="1" noChangeArrowheads="1" noChangeShapeType="1" noTextEdit="1"/>
-          </p:cNvSpPr>
-          <p:nvPr>
-            <p:extLst>
-              <p:ext uri="{386F3935-93C4-4BCD-93E2-E3B085C9AB24}">
-                <p16:designElem xmlns:p16="http://schemas.microsoft.com/office/powerpoint/2015/main" val="1"/>
-              </p:ext>
-            </p:extLst>
-          </p:nvPr>
-        </p:nvSpPr>
-        <p:spPr bwMode="ltGray">
-          <a:xfrm>
-            <a:off x="321564" y="320040"/>
-            <a:ext cx="11548872" cy="6217920"/>
-          </a:xfrm>
-          <a:prstGeom prst="rect">
-            <a:avLst/>
-          </a:prstGeom>
-          <a:solidFill>
-            <a:schemeClr val="tx1">
-              <a:alpha val="8000"/>
-            </a:schemeClr>
-          </a:solidFill>
-          <a:ln w="127000" cap="sq" cmpd="thinThick">
-            <a:noFill/>
-          </a:ln>
-        </p:spPr>
-        <p:style>
-          <a:lnRef idx="2">
-            <a:schemeClr val="accent1">
-              <a:shade val="50000"/>
-            </a:schemeClr>
-          </a:lnRef>
-          <a:fillRef idx="1">
-            <a:schemeClr val="accent1"/>
-          </a:fillRef>
-          <a:effectRef idx="0">
-            <a:schemeClr val="accent1"/>
-          </a:effectRef>
-          <a:fontRef idx="minor">
-            <a:schemeClr val="lt1"/>
-          </a:fontRef>
-        </p:style>
-        <p:txBody>
-          <a:bodyPr rtlCol="0" anchor="ctr"/>
-          <a:lstStyle/>
-          <a:p>
-            <a:pPr algn="ctr"/>
-            <a:endParaRPr lang="en-US"/>
-          </a:p>
-        </p:txBody>
-      </p:sp>
-      <p:sp>
-        <p:nvSpPr>
-          <p:cNvPr id="2" name="Titre 1">
-            <a:extLst>
-              <a:ext uri="{FF2B5EF4-FFF2-40B4-BE49-F238E27FC236}">
-                <a16:creationId xmlns:a16="http://schemas.microsoft.com/office/drawing/2014/main" id="{928BE225-173B-43BC-A52B-3829A95E26F7}"/>
-              </a:ext>
-            </a:extLst>
-          </p:cNvPr>
-          <p:cNvSpPr>
-            <a:spLocks noGrp="1"/>
-          </p:cNvSpPr>
-          <p:nvPr>
-            <p:ph type="title"/>
-          </p:nvPr>
-        </p:nvSpPr>
-        <p:spPr>
-          <a:xfrm>
-            <a:off x="838200" y="963877"/>
-            <a:ext cx="3494362" cy="4930246"/>
-          </a:xfrm>
-        </p:spPr>
-        <p:txBody>
-          <a:bodyPr>
-            <a:normAutofit/>
-          </a:bodyPr>
-          <a:lstStyle/>
-          <a:p>
-            <a:pPr algn="r"/>
-            <a:r>
-              <a:rPr lang="fr-FR" sz="8000" dirty="0">
-                <a:solidFill>
-                  <a:schemeClr val="accent1"/>
-                </a:solidFill>
-              </a:rPr>
-              <a:t>Stories</a:t>
-            </a:r>
-          </a:p>
-        </p:txBody>
-      </p:sp>
-      <p:cxnSp>
-        <p:nvCxnSpPr>
-          <p:cNvPr id="41" name="Straight Connector 9">
-            <a:extLst>
-              <a:ext uri="{FF2B5EF4-FFF2-40B4-BE49-F238E27FC236}">
-                <a16:creationId xmlns:a16="http://schemas.microsoft.com/office/drawing/2014/main" id="{2D72A2C9-F3CA-4216-8BAD-FA4C970C3C4E}"/>
-              </a:ext>
-              <a:ext uri="{C183D7F6-B498-43B3-948B-1728B52AA6E4}">
-                <adec:decorative xmlns:adec="http://schemas.microsoft.com/office/drawing/2017/decorative" val="1"/>
-              </a:ext>
-            </a:extLst>
-          </p:cNvPr>
-          <p:cNvCxnSpPr>
-            <a:cxnSpLocks noGrp="1" noRot="1" noChangeAspect="1" noMove="1" noResize="1" noEditPoints="1" noAdjustHandles="1" noChangeArrowheads="1" noChangeShapeType="1"/>
-          </p:cNvCxnSpPr>
-          <p:nvPr>
-            <p:extLst>
-              <p:ext uri="{386F3935-93C4-4BCD-93E2-E3B085C9AB24}">
-                <p16:designElem xmlns:p16="http://schemas.microsoft.com/office/powerpoint/2015/main" val="1"/>
-              </p:ext>
-            </p:extLst>
-          </p:nvPr>
-        </p:nvCxnSpPr>
-        <p:spPr>
-          <a:xfrm>
-            <a:off x="4654296" y="2057400"/>
-            <a:ext cx="0" cy="2743200"/>
-          </a:xfrm>
-          <a:prstGeom prst="line">
-            <a:avLst/>
-          </a:prstGeom>
-          <a:ln w="19050">
-            <a:solidFill>
-              <a:schemeClr val="tx1">
-                <a:lumMod val="85000"/>
-                <a:lumOff val="15000"/>
-              </a:schemeClr>
-            </a:solidFill>
-          </a:ln>
-        </p:spPr>
-        <p:style>
-          <a:lnRef idx="1">
-            <a:schemeClr val="accent1"/>
-          </a:lnRef>
-          <a:fillRef idx="0">
-            <a:schemeClr val="accent1"/>
-          </a:fillRef>
-          <a:effectRef idx="0">
-            <a:schemeClr val="accent1"/>
-          </a:effectRef>
-          <a:fontRef idx="minor">
-            <a:schemeClr val="tx1"/>
-          </a:fontRef>
-        </p:style>
-      </p:cxnSp>
-      <p:sp>
-        <p:nvSpPr>
-          <p:cNvPr id="3" name="Espace réservé du contenu 2">
-            <a:extLst>
-              <a:ext uri="{FF2B5EF4-FFF2-40B4-BE49-F238E27FC236}">
-                <a16:creationId xmlns:a16="http://schemas.microsoft.com/office/drawing/2014/main" id="{4D42CD94-E4E8-43F8-BAC3-0E0D70DCF7CC}"/>
-              </a:ext>
-            </a:extLst>
-          </p:cNvPr>
-          <p:cNvSpPr>
-            <a:spLocks noGrp="1"/>
-          </p:cNvSpPr>
-          <p:nvPr>
-            <p:ph idx="1"/>
-          </p:nvPr>
-        </p:nvSpPr>
-        <p:spPr>
-          <a:xfrm>
-            <a:off x="4976031" y="963877"/>
-            <a:ext cx="6377769" cy="4930246"/>
-          </a:xfrm>
-        </p:spPr>
-        <p:txBody>
-          <a:bodyPr anchor="ctr">
-            <a:normAutofit/>
-          </a:bodyPr>
-          <a:lstStyle/>
-          <a:p>
-            <a:pPr marL="0" indent="0" algn="ctr">
-              <a:buNone/>
-            </a:pPr>
-            <a:r>
-              <a:rPr lang="fr-FR" sz="5400" dirty="0"/>
-              <a:t>6 out of 7 stories </a:t>
-            </a:r>
-            <a:r>
-              <a:rPr lang="fr-FR" sz="5400" dirty="0" err="1"/>
-              <a:t>commited</a:t>
-            </a:r>
-            <a:r>
-              <a:rPr lang="fr-FR" sz="5400" dirty="0"/>
-              <a:t> </a:t>
-            </a:r>
-            <a:r>
-              <a:rPr lang="fr-FR" sz="5400" dirty="0" err="1"/>
-              <a:t>were</a:t>
-            </a:r>
-            <a:r>
-              <a:rPr lang="fr-FR" sz="5400" dirty="0"/>
-              <a:t> </a:t>
-            </a:r>
-            <a:r>
-              <a:rPr lang="fr-FR" sz="5400" dirty="0" err="1"/>
-              <a:t>done</a:t>
-            </a:r>
-            <a:endParaRPr lang="fr-FR" sz="5400" dirty="0"/>
-          </a:p>
-        </p:txBody>
-      </p:sp>
-    </p:spTree>
-    <p:extLst>
-      <p:ext uri="{BB962C8B-B14F-4D97-AF65-F5344CB8AC3E}">
-        <p14:creationId xmlns:p14="http://schemas.microsoft.com/office/powerpoint/2010/main" val="3942152057"/>
-      </p:ext>
-    </p:extLst>
-  </p:cSld>
-  <p:clrMapOvr>
-    <a:masterClrMapping/>
-  </p:clrMapOvr>
-</p:sld>
-</file>
-
-<file path=ppt/slides/slide3.xml><?xml version="1.0" encoding="utf-8"?>
+<file path=ppt/slides/slide10.xml><?xml version="1.0" encoding="utf-8"?>
 <p:sld xmlns:a="http://schemas.openxmlformats.org/drawingml/2006/main" xmlns:r="http://schemas.openxmlformats.org/officeDocument/2006/relationships" xmlns:p="http://schemas.openxmlformats.org/presentationml/2006/main">
   <p:cSld>
     <p:spTree>
@@ -3744,25 +3493,25 @@
           <a:p>
             <a:pPr algn="ctr"/>
             <a:r>
-              <a:rPr lang="en-US" sz="5400" b="1" dirty="0">
+              <a:rPr lang="en-US" sz="4800" b="1" dirty="0">
                 <a:solidFill>
                   <a:schemeClr val="tx1"/>
                 </a:solidFill>
               </a:rPr>
-              <a:t>Story #22</a:t>
+              <a:t>Story #27 (not done)</a:t>
             </a:r>
           </a:p>
           <a:p>
             <a:pPr algn="ctr"/>
             <a:r>
-              <a:rPr lang="en-US" sz="5400" dirty="0">
+              <a:rPr lang="en-US" sz="4800" dirty="0">
                 <a:solidFill>
                   <a:schemeClr val="tx1"/>
                 </a:solidFill>
               </a:rPr>
-              <a:t>As a parent I want to see the final grades of the term.</a:t>
-            </a:r>
-            <a:endParaRPr lang="fr-FR" sz="5400" dirty="0">
+              <a:t>As an administrative officer I want to build the timetable of classes so that I can check all constraints are satisfied.</a:t>
+            </a:r>
+            <a:endParaRPr lang="fr-FR" sz="4800" dirty="0">
               <a:solidFill>
                 <a:schemeClr val="tx1"/>
               </a:solidFill>
@@ -3773,7 +3522,884 @@
     </p:spTree>
     <p:extLst>
       <p:ext uri="{BB962C8B-B14F-4D97-AF65-F5344CB8AC3E}">
-        <p14:creationId xmlns:p14="http://schemas.microsoft.com/office/powerpoint/2010/main" val="3454268697"/>
+        <p14:creationId xmlns:p14="http://schemas.microsoft.com/office/powerpoint/2010/main" val="868173716"/>
+      </p:ext>
+    </p:extLst>
+  </p:cSld>
+  <p:clrMapOvr>
+    <a:masterClrMapping/>
+  </p:clrMapOvr>
+</p:sld>
+</file>
+
+<file path=ppt/slides/slide2.xml><?xml version="1.0" encoding="utf-8"?>
+<p:sld xmlns:a="http://schemas.openxmlformats.org/drawingml/2006/main" xmlns:r="http://schemas.openxmlformats.org/officeDocument/2006/relationships" xmlns:p="http://schemas.openxmlformats.org/presentationml/2006/main">
+  <p:cSld>
+    <p:bg>
+      <p:bgPr>
+        <a:solidFill>
+          <a:schemeClr val="bg1"/>
+        </a:solidFill>
+        <a:effectLst/>
+      </p:bgPr>
+    </p:bg>
+    <p:spTree>
+      <p:nvGrpSpPr>
+        <p:cNvPr id="1" name=""/>
+        <p:cNvGrpSpPr/>
+        <p:nvPr/>
+      </p:nvGrpSpPr>
+      <p:grpSpPr>
+        <a:xfrm>
+          <a:off x="0" y="0"/>
+          <a:ext cx="0" cy="0"/>
+          <a:chOff x="0" y="0"/>
+          <a:chExt cx="0" cy="0"/>
+        </a:xfrm>
+      </p:grpSpPr>
+      <p:sp>
+        <p:nvSpPr>
+          <p:cNvPr id="40" name="Rectangle 7">
+            <a:extLst>
+              <a:ext uri="{FF2B5EF4-FFF2-40B4-BE49-F238E27FC236}">
+                <a16:creationId xmlns:a16="http://schemas.microsoft.com/office/drawing/2014/main" id="{8D70B121-56F4-4848-B38B-182089D909FA}"/>
+              </a:ext>
+              <a:ext uri="{C183D7F6-B498-43B3-948B-1728B52AA6E4}">
+                <adec:decorative xmlns:adec="http://schemas.microsoft.com/office/drawing/2017/decorative" val="1"/>
+              </a:ext>
+            </a:extLst>
+          </p:cNvPr>
+          <p:cNvSpPr>
+            <a:spLocks noGrp="1" noRot="1" noChangeAspect="1" noMove="1" noResize="1" noEditPoints="1" noAdjustHandles="1" noChangeArrowheads="1" noChangeShapeType="1" noTextEdit="1"/>
+          </p:cNvSpPr>
+          <p:nvPr>
+            <p:extLst>
+              <p:ext uri="{386F3935-93C4-4BCD-93E2-E3B085C9AB24}">
+                <p16:designElem xmlns:p16="http://schemas.microsoft.com/office/powerpoint/2015/main" val="1"/>
+              </p:ext>
+            </p:extLst>
+          </p:nvPr>
+        </p:nvSpPr>
+        <p:spPr bwMode="ltGray">
+          <a:xfrm>
+            <a:off x="321564" y="320040"/>
+            <a:ext cx="11548872" cy="6217920"/>
+          </a:xfrm>
+          <a:prstGeom prst="rect">
+            <a:avLst/>
+          </a:prstGeom>
+          <a:solidFill>
+            <a:schemeClr val="tx1">
+              <a:alpha val="8000"/>
+            </a:schemeClr>
+          </a:solidFill>
+          <a:ln w="127000" cap="sq" cmpd="thinThick">
+            <a:noFill/>
+          </a:ln>
+        </p:spPr>
+        <p:style>
+          <a:lnRef idx="2">
+            <a:schemeClr val="accent1">
+              <a:shade val="50000"/>
+            </a:schemeClr>
+          </a:lnRef>
+          <a:fillRef idx="1">
+            <a:schemeClr val="accent1"/>
+          </a:fillRef>
+          <a:effectRef idx="0">
+            <a:schemeClr val="accent1"/>
+          </a:effectRef>
+          <a:fontRef idx="minor">
+            <a:schemeClr val="lt1"/>
+          </a:fontRef>
+        </p:style>
+        <p:txBody>
+          <a:bodyPr rtlCol="0" anchor="ctr"/>
+          <a:lstStyle/>
+          <a:p>
+            <a:pPr algn="ctr"/>
+            <a:endParaRPr lang="en-US"/>
+          </a:p>
+        </p:txBody>
+      </p:sp>
+      <p:sp>
+        <p:nvSpPr>
+          <p:cNvPr id="2" name="Titre 1">
+            <a:extLst>
+              <a:ext uri="{FF2B5EF4-FFF2-40B4-BE49-F238E27FC236}">
+                <a16:creationId xmlns:a16="http://schemas.microsoft.com/office/drawing/2014/main" id="{928BE225-173B-43BC-A52B-3829A95E26F7}"/>
+              </a:ext>
+            </a:extLst>
+          </p:cNvPr>
+          <p:cNvSpPr>
+            <a:spLocks noGrp="1"/>
+          </p:cNvSpPr>
+          <p:nvPr>
+            <p:ph type="title"/>
+          </p:nvPr>
+        </p:nvSpPr>
+        <p:spPr>
+          <a:xfrm>
+            <a:off x="838200" y="963877"/>
+            <a:ext cx="3494362" cy="4930246"/>
+          </a:xfrm>
+        </p:spPr>
+        <p:txBody>
+          <a:bodyPr>
+            <a:normAutofit/>
+          </a:bodyPr>
+          <a:lstStyle/>
+          <a:p>
+            <a:pPr algn="r"/>
+            <a:r>
+              <a:rPr lang="fr-FR" sz="8000" dirty="0">
+                <a:solidFill>
+                  <a:schemeClr val="accent1"/>
+                </a:solidFill>
+              </a:rPr>
+              <a:t>Stories</a:t>
+            </a:r>
+          </a:p>
+        </p:txBody>
+      </p:sp>
+      <p:cxnSp>
+        <p:nvCxnSpPr>
+          <p:cNvPr id="41" name="Straight Connector 9">
+            <a:extLst>
+              <a:ext uri="{FF2B5EF4-FFF2-40B4-BE49-F238E27FC236}">
+                <a16:creationId xmlns:a16="http://schemas.microsoft.com/office/drawing/2014/main" id="{2D72A2C9-F3CA-4216-8BAD-FA4C970C3C4E}"/>
+              </a:ext>
+              <a:ext uri="{C183D7F6-B498-43B3-948B-1728B52AA6E4}">
+                <adec:decorative xmlns:adec="http://schemas.microsoft.com/office/drawing/2017/decorative" val="1"/>
+              </a:ext>
+            </a:extLst>
+          </p:cNvPr>
+          <p:cNvCxnSpPr>
+            <a:cxnSpLocks noGrp="1" noRot="1" noChangeAspect="1" noMove="1" noResize="1" noEditPoints="1" noAdjustHandles="1" noChangeArrowheads="1" noChangeShapeType="1"/>
+          </p:cNvCxnSpPr>
+          <p:nvPr>
+            <p:extLst>
+              <p:ext uri="{386F3935-93C4-4BCD-93E2-E3B085C9AB24}">
+                <p16:designElem xmlns:p16="http://schemas.microsoft.com/office/powerpoint/2015/main" val="1"/>
+              </p:ext>
+            </p:extLst>
+          </p:nvPr>
+        </p:nvCxnSpPr>
+        <p:spPr>
+          <a:xfrm>
+            <a:off x="4654296" y="2057400"/>
+            <a:ext cx="0" cy="2743200"/>
+          </a:xfrm>
+          <a:prstGeom prst="line">
+            <a:avLst/>
+          </a:prstGeom>
+          <a:ln w="19050">
+            <a:solidFill>
+              <a:schemeClr val="tx1">
+                <a:lumMod val="85000"/>
+                <a:lumOff val="15000"/>
+              </a:schemeClr>
+            </a:solidFill>
+          </a:ln>
+        </p:spPr>
+        <p:style>
+          <a:lnRef idx="1">
+            <a:schemeClr val="accent1"/>
+          </a:lnRef>
+          <a:fillRef idx="0">
+            <a:schemeClr val="accent1"/>
+          </a:fillRef>
+          <a:effectRef idx="0">
+            <a:schemeClr val="accent1"/>
+          </a:effectRef>
+          <a:fontRef idx="minor">
+            <a:schemeClr val="tx1"/>
+          </a:fontRef>
+        </p:style>
+      </p:cxnSp>
+      <p:sp>
+        <p:nvSpPr>
+          <p:cNvPr id="3" name="Espace réservé du contenu 2">
+            <a:extLst>
+              <a:ext uri="{FF2B5EF4-FFF2-40B4-BE49-F238E27FC236}">
+                <a16:creationId xmlns:a16="http://schemas.microsoft.com/office/drawing/2014/main" id="{4D42CD94-E4E8-43F8-BAC3-0E0D70DCF7CC}"/>
+              </a:ext>
+            </a:extLst>
+          </p:cNvPr>
+          <p:cNvSpPr>
+            <a:spLocks noGrp="1"/>
+          </p:cNvSpPr>
+          <p:nvPr>
+            <p:ph idx="1"/>
+          </p:nvPr>
+        </p:nvSpPr>
+        <p:spPr>
+          <a:xfrm>
+            <a:off x="4976031" y="963877"/>
+            <a:ext cx="6377769" cy="4930246"/>
+          </a:xfrm>
+        </p:spPr>
+        <p:txBody>
+          <a:bodyPr anchor="ctr">
+            <a:normAutofit/>
+          </a:bodyPr>
+          <a:lstStyle/>
+          <a:p>
+            <a:pPr marL="0" indent="0" algn="ctr">
+              <a:buNone/>
+            </a:pPr>
+            <a:r>
+              <a:rPr lang="fr-FR" sz="5400" dirty="0"/>
+              <a:t>6 out of 7 stories </a:t>
+            </a:r>
+            <a:r>
+              <a:rPr lang="fr-FR" sz="5400" dirty="0" err="1"/>
+              <a:t>commited</a:t>
+            </a:r>
+            <a:r>
+              <a:rPr lang="fr-FR" sz="5400" dirty="0"/>
+              <a:t> </a:t>
+            </a:r>
+            <a:r>
+              <a:rPr lang="fr-FR" sz="5400" dirty="0" err="1"/>
+              <a:t>were</a:t>
+            </a:r>
+            <a:r>
+              <a:rPr lang="fr-FR" sz="5400" dirty="0"/>
+              <a:t> </a:t>
+            </a:r>
+            <a:r>
+              <a:rPr lang="fr-FR" sz="5400" dirty="0" err="1"/>
+              <a:t>done</a:t>
+            </a:r>
+            <a:endParaRPr lang="fr-FR" sz="5400" dirty="0"/>
+          </a:p>
+        </p:txBody>
+      </p:sp>
+    </p:spTree>
+    <p:extLst>
+      <p:ext uri="{BB962C8B-B14F-4D97-AF65-F5344CB8AC3E}">
+        <p14:creationId xmlns:p14="http://schemas.microsoft.com/office/powerpoint/2010/main" val="3942152057"/>
+      </p:ext>
+    </p:extLst>
+  </p:cSld>
+  <p:clrMapOvr>
+    <a:masterClrMapping/>
+  </p:clrMapOvr>
+</p:sld>
+</file>
+
+<file path=ppt/slides/slide3.xml><?xml version="1.0" encoding="utf-8"?>
+<p:sld xmlns:a="http://schemas.openxmlformats.org/drawingml/2006/main" xmlns:r="http://schemas.openxmlformats.org/officeDocument/2006/relationships" xmlns:p="http://schemas.openxmlformats.org/presentationml/2006/main">
+  <p:cSld>
+    <p:bg>
+      <p:bgPr>
+        <a:solidFill>
+          <a:schemeClr val="bg1"/>
+        </a:solidFill>
+        <a:effectLst/>
+      </p:bgPr>
+    </p:bg>
+    <p:spTree>
+      <p:nvGrpSpPr>
+        <p:cNvPr id="1" name=""/>
+        <p:cNvGrpSpPr/>
+        <p:nvPr/>
+      </p:nvGrpSpPr>
+      <p:grpSpPr>
+        <a:xfrm>
+          <a:off x="0" y="0"/>
+          <a:ext cx="0" cy="0"/>
+          <a:chOff x="0" y="0"/>
+          <a:chExt cx="0" cy="0"/>
+        </a:xfrm>
+      </p:grpSpPr>
+      <p:sp>
+        <p:nvSpPr>
+          <p:cNvPr id="26" name="Rectangle 11">
+            <a:extLst>
+              <a:ext uri="{FF2B5EF4-FFF2-40B4-BE49-F238E27FC236}">
+                <a16:creationId xmlns:a16="http://schemas.microsoft.com/office/drawing/2014/main" id="{F3060C83-F051-4F0E-ABAD-AA0DFC48B218}"/>
+              </a:ext>
+              <a:ext uri="{C183D7F6-B498-43B3-948B-1728B52AA6E4}">
+                <adec:decorative xmlns:adec="http://schemas.microsoft.com/office/drawing/2017/decorative" val="1"/>
+              </a:ext>
+            </a:extLst>
+          </p:cNvPr>
+          <p:cNvSpPr>
+            <a:spLocks noGrp="1" noRot="1" noChangeAspect="1" noMove="1" noResize="1" noEditPoints="1" noAdjustHandles="1" noChangeArrowheads="1" noChangeShapeType="1" noTextEdit="1"/>
+          </p:cNvSpPr>
+          <p:nvPr>
+            <p:extLst>
+              <p:ext uri="{386F3935-93C4-4BCD-93E2-E3B085C9AB24}">
+                <p16:designElem xmlns:p16="http://schemas.microsoft.com/office/powerpoint/2015/main" val="1"/>
+              </p:ext>
+            </p:extLst>
+          </p:nvPr>
+        </p:nvSpPr>
+        <p:spPr>
+          <a:xfrm>
+            <a:off x="0" y="0"/>
+            <a:ext cx="12192000" cy="6858000"/>
+          </a:xfrm>
+          <a:prstGeom prst="rect">
+            <a:avLst/>
+          </a:prstGeom>
+          <a:solidFill>
+            <a:schemeClr val="bg1"/>
+          </a:solidFill>
+          <a:ln>
+            <a:noFill/>
+          </a:ln>
+        </p:spPr>
+        <p:style>
+          <a:lnRef idx="2">
+            <a:schemeClr val="accent1">
+              <a:shade val="50000"/>
+            </a:schemeClr>
+          </a:lnRef>
+          <a:fillRef idx="1">
+            <a:schemeClr val="accent1"/>
+          </a:fillRef>
+          <a:effectRef idx="0">
+            <a:schemeClr val="accent1"/>
+          </a:effectRef>
+          <a:fontRef idx="minor">
+            <a:schemeClr val="lt1"/>
+          </a:fontRef>
+        </p:style>
+        <p:txBody>
+          <a:bodyPr rtlCol="0" anchor="ctr"/>
+          <a:lstStyle/>
+          <a:p>
+            <a:pPr algn="ctr"/>
+            <a:endParaRPr lang="en-US" dirty="0"/>
+          </a:p>
+        </p:txBody>
+      </p:sp>
+      <p:sp>
+        <p:nvSpPr>
+          <p:cNvPr id="27" name="Freeform: Shape 13">
+            <a:extLst>
+              <a:ext uri="{FF2B5EF4-FFF2-40B4-BE49-F238E27FC236}">
+                <a16:creationId xmlns:a16="http://schemas.microsoft.com/office/drawing/2014/main" id="{83C98ABE-055B-441F-B07E-44F97F083C39}"/>
+              </a:ext>
+              <a:ext uri="{C183D7F6-B498-43B3-948B-1728B52AA6E4}">
+                <adec:decorative xmlns:adec="http://schemas.microsoft.com/office/drawing/2017/decorative" val="1"/>
+              </a:ext>
+            </a:extLst>
+          </p:cNvPr>
+          <p:cNvSpPr>
+            <a:spLocks noGrp="1" noRot="1" noChangeAspect="1" noMove="1" noResize="1" noEditPoints="1" noAdjustHandles="1" noChangeArrowheads="1" noChangeShapeType="1" noTextEdit="1"/>
+          </p:cNvSpPr>
+          <p:nvPr>
+            <p:extLst>
+              <p:ext uri="{386F3935-93C4-4BCD-93E2-E3B085C9AB24}">
+                <p16:designElem xmlns:p16="http://schemas.microsoft.com/office/powerpoint/2015/main" val="1"/>
+              </p:ext>
+            </p:extLst>
+          </p:nvPr>
+        </p:nvSpPr>
+        <p:spPr>
+          <a:xfrm rot="18900000" flipH="1">
+            <a:off x="-376156" y="-253670"/>
+            <a:ext cx="1827638" cy="1376989"/>
+          </a:xfrm>
+          <a:custGeom>
+            <a:avLst/>
+            <a:gdLst>
+              <a:gd name="connsiteX0" fmla="*/ 0 w 1827638"/>
+              <a:gd name="connsiteY0" fmla="*/ 987379 h 1376989"/>
+              <a:gd name="connsiteX1" fmla="*/ 987379 w 1827638"/>
+              <a:gd name="connsiteY1" fmla="*/ 0 h 1376989"/>
+              <a:gd name="connsiteX2" fmla="*/ 1827638 w 1827638"/>
+              <a:gd name="connsiteY2" fmla="*/ 840260 h 1376989"/>
+              <a:gd name="connsiteX3" fmla="*/ 1827638 w 1827638"/>
+              <a:gd name="connsiteY3" fmla="*/ 1376989 h 1376989"/>
+              <a:gd name="connsiteX4" fmla="*/ 0 w 1827638"/>
+              <a:gd name="connsiteY4" fmla="*/ 1376989 h 1376989"/>
+            </a:gdLst>
+            <a:ahLst/>
+            <a:cxnLst>
+              <a:cxn ang="0">
+                <a:pos x="connsiteX0" y="connsiteY0"/>
+              </a:cxn>
+              <a:cxn ang="0">
+                <a:pos x="connsiteX1" y="connsiteY1"/>
+              </a:cxn>
+              <a:cxn ang="0">
+                <a:pos x="connsiteX2" y="connsiteY2"/>
+              </a:cxn>
+              <a:cxn ang="0">
+                <a:pos x="connsiteX3" y="connsiteY3"/>
+              </a:cxn>
+              <a:cxn ang="0">
+                <a:pos x="connsiteX4" y="connsiteY4"/>
+              </a:cxn>
+            </a:cxnLst>
+            <a:rect l="l" t="t" r="r" b="b"/>
+            <a:pathLst>
+              <a:path w="1827638" h="1376989">
+                <a:moveTo>
+                  <a:pt x="0" y="987379"/>
+                </a:moveTo>
+                <a:lnTo>
+                  <a:pt x="987379" y="0"/>
+                </a:lnTo>
+                <a:lnTo>
+                  <a:pt x="1827638" y="840260"/>
+                </a:lnTo>
+                <a:lnTo>
+                  <a:pt x="1827638" y="1376989"/>
+                </a:lnTo>
+                <a:lnTo>
+                  <a:pt x="0" y="1376989"/>
+                </a:lnTo>
+                <a:close/>
+              </a:path>
+            </a:pathLst>
+          </a:custGeom>
+          <a:solidFill>
+            <a:schemeClr val="accent1">
+              <a:alpha val="30000"/>
+            </a:schemeClr>
+          </a:solidFill>
+          <a:ln>
+            <a:noFill/>
+          </a:ln>
+        </p:spPr>
+        <p:style>
+          <a:lnRef idx="2">
+            <a:schemeClr val="accent1">
+              <a:shade val="50000"/>
+            </a:schemeClr>
+          </a:lnRef>
+          <a:fillRef idx="1">
+            <a:schemeClr val="accent1"/>
+          </a:fillRef>
+          <a:effectRef idx="0">
+            <a:schemeClr val="accent1"/>
+          </a:effectRef>
+          <a:fontRef idx="minor">
+            <a:schemeClr val="lt1"/>
+          </a:fontRef>
+        </p:style>
+        <p:txBody>
+          <a:bodyPr rtlCol="0" anchor="ctr"/>
+          <a:lstStyle/>
+          <a:p>
+            <a:pPr algn="ctr"/>
+            <a:endParaRPr lang="en-US" dirty="0"/>
+          </a:p>
+        </p:txBody>
+      </p:sp>
+      <p:sp>
+        <p:nvSpPr>
+          <p:cNvPr id="16" name="Rectangle 15">
+            <a:extLst>
+              <a:ext uri="{FF2B5EF4-FFF2-40B4-BE49-F238E27FC236}">
+                <a16:creationId xmlns:a16="http://schemas.microsoft.com/office/drawing/2014/main" id="{29FDB030-9B49-4CED-8CCD-4D99382388AC}"/>
+              </a:ext>
+              <a:ext uri="{C183D7F6-B498-43B3-948B-1728B52AA6E4}">
+                <adec:decorative xmlns:adec="http://schemas.microsoft.com/office/drawing/2017/decorative" val="1"/>
+              </a:ext>
+            </a:extLst>
+          </p:cNvPr>
+          <p:cNvSpPr>
+            <a:spLocks noGrp="1" noRot="1" noChangeAspect="1" noMove="1" noResize="1" noEditPoints="1" noAdjustHandles="1" noChangeArrowheads="1" noChangeShapeType="1" noTextEdit="1"/>
+          </p:cNvSpPr>
+          <p:nvPr>
+            <p:extLst>
+              <p:ext uri="{386F3935-93C4-4BCD-93E2-E3B085C9AB24}">
+                <p16:designElem xmlns:p16="http://schemas.microsoft.com/office/powerpoint/2015/main" val="1"/>
+              </p:ext>
+            </p:extLst>
+          </p:nvPr>
+        </p:nvSpPr>
+        <p:spPr>
+          <a:xfrm rot="18900000" flipH="1">
+            <a:off x="891641" y="422146"/>
+            <a:ext cx="645368" cy="645368"/>
+          </a:xfrm>
+          <a:prstGeom prst="rect">
+            <a:avLst/>
+          </a:prstGeom>
+          <a:solidFill>
+            <a:schemeClr val="accent1">
+              <a:alpha val="30000"/>
+            </a:schemeClr>
+          </a:solidFill>
+          <a:ln>
+            <a:noFill/>
+          </a:ln>
+        </p:spPr>
+        <p:style>
+          <a:lnRef idx="2">
+            <a:schemeClr val="accent1">
+              <a:shade val="50000"/>
+            </a:schemeClr>
+          </a:lnRef>
+          <a:fillRef idx="1">
+            <a:schemeClr val="accent1"/>
+          </a:fillRef>
+          <a:effectRef idx="0">
+            <a:schemeClr val="accent1"/>
+          </a:effectRef>
+          <a:fontRef idx="minor">
+            <a:schemeClr val="lt1"/>
+          </a:fontRef>
+        </p:style>
+        <p:txBody>
+          <a:bodyPr rtlCol="0" anchor="ctr"/>
+          <a:lstStyle/>
+          <a:p>
+            <a:pPr algn="ctr"/>
+            <a:endParaRPr lang="en-US"/>
+          </a:p>
+        </p:txBody>
+      </p:sp>
+      <p:sp>
+        <p:nvSpPr>
+          <p:cNvPr id="18" name="Rectangle 17">
+            <a:extLst>
+              <a:ext uri="{FF2B5EF4-FFF2-40B4-BE49-F238E27FC236}">
+                <a16:creationId xmlns:a16="http://schemas.microsoft.com/office/drawing/2014/main" id="{3783CA14-24A1-485C-8B30-D6A5D87987AD}"/>
+              </a:ext>
+              <a:ext uri="{C183D7F6-B498-43B3-948B-1728B52AA6E4}">
+                <adec:decorative xmlns:adec="http://schemas.microsoft.com/office/drawing/2017/decorative" val="1"/>
+              </a:ext>
+            </a:extLst>
+          </p:cNvPr>
+          <p:cNvSpPr>
+            <a:spLocks noGrp="1" noRot="1" noChangeAspect="1" noMove="1" noResize="1" noEditPoints="1" noAdjustHandles="1" noChangeArrowheads="1" noChangeShapeType="1" noTextEdit="1"/>
+          </p:cNvSpPr>
+          <p:nvPr>
+            <p:extLst>
+              <p:ext uri="{386F3935-93C4-4BCD-93E2-E3B085C9AB24}">
+                <p16:designElem xmlns:p16="http://schemas.microsoft.com/office/powerpoint/2015/main" val="1"/>
+              </p:ext>
+            </p:extLst>
+          </p:nvPr>
+        </p:nvSpPr>
+        <p:spPr>
+          <a:xfrm rot="18900000" flipH="1">
+            <a:off x="10043482" y="655140"/>
+            <a:ext cx="687472" cy="687472"/>
+          </a:xfrm>
+          <a:prstGeom prst="rect">
+            <a:avLst/>
+          </a:prstGeom>
+          <a:solidFill>
+            <a:schemeClr val="accent4">
+              <a:alpha val="30000"/>
+            </a:schemeClr>
+          </a:solidFill>
+          <a:ln>
+            <a:noFill/>
+          </a:ln>
+        </p:spPr>
+        <p:style>
+          <a:lnRef idx="2">
+            <a:schemeClr val="accent1">
+              <a:shade val="50000"/>
+            </a:schemeClr>
+          </a:lnRef>
+          <a:fillRef idx="1">
+            <a:schemeClr val="accent1"/>
+          </a:fillRef>
+          <a:effectRef idx="0">
+            <a:schemeClr val="accent1"/>
+          </a:effectRef>
+          <a:fontRef idx="minor">
+            <a:schemeClr val="lt1"/>
+          </a:fontRef>
+        </p:style>
+        <p:txBody>
+          <a:bodyPr rtlCol="0" anchor="ctr"/>
+          <a:lstStyle/>
+          <a:p>
+            <a:pPr algn="ctr"/>
+            <a:endParaRPr lang="en-US"/>
+          </a:p>
+        </p:txBody>
+      </p:sp>
+      <p:sp>
+        <p:nvSpPr>
+          <p:cNvPr id="20" name="Freeform: Shape 19">
+            <a:extLst>
+              <a:ext uri="{FF2B5EF4-FFF2-40B4-BE49-F238E27FC236}">
+                <a16:creationId xmlns:a16="http://schemas.microsoft.com/office/drawing/2014/main" id="{9A97C86A-04D6-40F7-AE84-31AB43E6A846}"/>
+              </a:ext>
+              <a:ext uri="{C183D7F6-B498-43B3-948B-1728B52AA6E4}">
+                <adec:decorative xmlns:adec="http://schemas.microsoft.com/office/drawing/2017/decorative" val="1"/>
+              </a:ext>
+            </a:extLst>
+          </p:cNvPr>
+          <p:cNvSpPr>
+            <a:spLocks noGrp="1" noRot="1" noChangeAspect="1" noMove="1" noResize="1" noEditPoints="1" noAdjustHandles="1" noChangeArrowheads="1" noChangeShapeType="1" noTextEdit="1"/>
+          </p:cNvSpPr>
+          <p:nvPr>
+            <p:extLst>
+              <p:ext uri="{386F3935-93C4-4BCD-93E2-E3B085C9AB24}">
+                <p16:designElem xmlns:p16="http://schemas.microsoft.com/office/powerpoint/2015/main" val="1"/>
+              </p:ext>
+            </p:extLst>
+          </p:nvPr>
+        </p:nvSpPr>
+        <p:spPr>
+          <a:xfrm rot="10800000" flipH="1">
+            <a:off x="9356643" y="0"/>
+            <a:ext cx="2835357" cy="1480837"/>
+          </a:xfrm>
+          <a:custGeom>
+            <a:avLst/>
+            <a:gdLst>
+              <a:gd name="connsiteX0" fmla="*/ 2835357 w 2835357"/>
+              <a:gd name="connsiteY0" fmla="*/ 1480837 h 1480837"/>
+              <a:gd name="connsiteX1" fmla="*/ 0 w 2835357"/>
+              <a:gd name="connsiteY1" fmla="*/ 1480837 h 1480837"/>
+              <a:gd name="connsiteX2" fmla="*/ 1552727 w 2835357"/>
+              <a:gd name="connsiteY2" fmla="*/ 0 h 1480837"/>
+              <a:gd name="connsiteX3" fmla="*/ 2835357 w 2835357"/>
+              <a:gd name="connsiteY3" fmla="*/ 1223245 h 1480837"/>
+            </a:gdLst>
+            <a:ahLst/>
+            <a:cxnLst>
+              <a:cxn ang="0">
+                <a:pos x="connsiteX0" y="connsiteY0"/>
+              </a:cxn>
+              <a:cxn ang="0">
+                <a:pos x="connsiteX1" y="connsiteY1"/>
+              </a:cxn>
+              <a:cxn ang="0">
+                <a:pos x="connsiteX2" y="connsiteY2"/>
+              </a:cxn>
+              <a:cxn ang="0">
+                <a:pos x="connsiteX3" y="connsiteY3"/>
+              </a:cxn>
+            </a:cxnLst>
+            <a:rect l="l" t="t" r="r" b="b"/>
+            <a:pathLst>
+              <a:path w="2835357" h="1480837">
+                <a:moveTo>
+                  <a:pt x="2835357" y="1480837"/>
+                </a:moveTo>
+                <a:lnTo>
+                  <a:pt x="0" y="1480837"/>
+                </a:lnTo>
+                <a:lnTo>
+                  <a:pt x="1552727" y="0"/>
+                </a:lnTo>
+                <a:lnTo>
+                  <a:pt x="2835357" y="1223245"/>
+                </a:lnTo>
+                <a:close/>
+              </a:path>
+            </a:pathLst>
+          </a:custGeom>
+          <a:solidFill>
+            <a:schemeClr val="accent4">
+              <a:alpha val="30000"/>
+            </a:schemeClr>
+          </a:solidFill>
+          <a:ln>
+            <a:noFill/>
+          </a:ln>
+        </p:spPr>
+        <p:style>
+          <a:lnRef idx="2">
+            <a:schemeClr val="accent1">
+              <a:shade val="50000"/>
+            </a:schemeClr>
+          </a:lnRef>
+          <a:fillRef idx="1">
+            <a:schemeClr val="accent1"/>
+          </a:fillRef>
+          <a:effectRef idx="0">
+            <a:schemeClr val="accent1"/>
+          </a:effectRef>
+          <a:fontRef idx="minor">
+            <a:schemeClr val="lt1"/>
+          </a:fontRef>
+        </p:style>
+        <p:txBody>
+          <a:bodyPr wrap="square" rtlCol="0" anchor="ctr">
+            <a:noAutofit/>
+          </a:bodyPr>
+          <a:lstStyle/>
+          <a:p>
+            <a:pPr algn="ctr"/>
+            <a:endParaRPr lang="en-US" dirty="0"/>
+          </a:p>
+        </p:txBody>
+      </p:sp>
+      <p:sp>
+        <p:nvSpPr>
+          <p:cNvPr id="28" name="Isosceles Triangle 21">
+            <a:extLst>
+              <a:ext uri="{FF2B5EF4-FFF2-40B4-BE49-F238E27FC236}">
+                <a16:creationId xmlns:a16="http://schemas.microsoft.com/office/drawing/2014/main" id="{FF9F2414-84E8-453E-B1F3-389FDE8192D9}"/>
+              </a:ext>
+              <a:ext uri="{C183D7F6-B498-43B3-948B-1728B52AA6E4}">
+                <adec:decorative xmlns:adec="http://schemas.microsoft.com/office/drawing/2017/decorative" val="1"/>
+              </a:ext>
+            </a:extLst>
+          </p:cNvPr>
+          <p:cNvSpPr>
+            <a:spLocks noGrp="1" noRot="1" noChangeAspect="1" noMove="1" noResize="1" noEditPoints="1" noAdjustHandles="1" noChangeArrowheads="1" noChangeShapeType="1" noTextEdit="1"/>
+          </p:cNvSpPr>
+          <p:nvPr>
+            <p:extLst>
+              <p:ext uri="{386F3935-93C4-4BCD-93E2-E3B085C9AB24}">
+                <p16:designElem xmlns:p16="http://schemas.microsoft.com/office/powerpoint/2015/main" val="1"/>
+              </p:ext>
+            </p:extLst>
+          </p:nvPr>
+        </p:nvSpPr>
+        <p:spPr>
+          <a:xfrm flipH="1">
+            <a:off x="7976344" y="6115501"/>
+            <a:ext cx="1494513" cy="742499"/>
+          </a:xfrm>
+          <a:prstGeom prst="triangle">
+            <a:avLst/>
+          </a:prstGeom>
+          <a:solidFill>
+            <a:schemeClr val="accent1">
+              <a:alpha val="30000"/>
+            </a:schemeClr>
+          </a:solidFill>
+          <a:ln>
+            <a:noFill/>
+          </a:ln>
+        </p:spPr>
+        <p:style>
+          <a:lnRef idx="2">
+            <a:schemeClr val="accent1">
+              <a:shade val="50000"/>
+            </a:schemeClr>
+          </a:lnRef>
+          <a:fillRef idx="1">
+            <a:schemeClr val="accent1"/>
+          </a:fillRef>
+          <a:effectRef idx="0">
+            <a:schemeClr val="accent1"/>
+          </a:effectRef>
+          <a:fontRef idx="minor">
+            <a:schemeClr val="lt1"/>
+          </a:fontRef>
+        </p:style>
+        <p:txBody>
+          <a:bodyPr rtlCol="0" anchor="ctr"/>
+          <a:lstStyle/>
+          <a:p>
+            <a:pPr algn="ctr"/>
+            <a:endParaRPr lang="en-US"/>
+          </a:p>
+        </p:txBody>
+      </p:sp>
+      <p:pic>
+        <p:nvPicPr>
+          <p:cNvPr id="7" name="Image 6">
+            <a:extLst>
+              <a:ext uri="{FF2B5EF4-FFF2-40B4-BE49-F238E27FC236}">
+                <a16:creationId xmlns:a16="http://schemas.microsoft.com/office/drawing/2014/main" id="{C25361CB-3948-4495-A178-F7A9A3D9E1BB}"/>
+              </a:ext>
+            </a:extLst>
+          </p:cNvPr>
+          <p:cNvPicPr>
+            <a:picLocks noChangeAspect="1"/>
+          </p:cNvPicPr>
+          <p:nvPr/>
+        </p:nvPicPr>
+        <p:blipFill>
+          <a:blip r:embed="rId2"/>
+          <a:stretch>
+            <a:fillRect/>
+          </a:stretch>
+        </p:blipFill>
+        <p:spPr>
+          <a:xfrm>
+            <a:off x="1409624" y="277303"/>
+            <a:ext cx="9372751" cy="6209447"/>
+          </a:xfrm>
+          <a:prstGeom prst="rect">
+            <a:avLst/>
+          </a:prstGeom>
+          <a:ln>
+            <a:noFill/>
+          </a:ln>
+        </p:spPr>
+      </p:pic>
+      <p:sp>
+        <p:nvSpPr>
+          <p:cNvPr id="29" name="Isosceles Triangle 23">
+            <a:extLst>
+              <a:ext uri="{FF2B5EF4-FFF2-40B4-BE49-F238E27FC236}">
+                <a16:creationId xmlns:a16="http://schemas.microsoft.com/office/drawing/2014/main" id="{3ECA69A1-7536-43AC-85EF-C7106179F5ED}"/>
+              </a:ext>
+              <a:ext uri="{C183D7F6-B498-43B3-948B-1728B52AA6E4}">
+                <adec:decorative xmlns:adec="http://schemas.microsoft.com/office/drawing/2017/decorative" val="1"/>
+              </a:ext>
+            </a:extLst>
+          </p:cNvPr>
+          <p:cNvSpPr>
+            <a:spLocks noGrp="1" noRot="1" noChangeAspect="1" noMove="1" noResize="1" noEditPoints="1" noAdjustHandles="1" noChangeArrowheads="1" noChangeShapeType="1" noTextEdit="1"/>
+          </p:cNvSpPr>
+          <p:nvPr>
+            <p:extLst>
+              <p:ext uri="{386F3935-93C4-4BCD-93E2-E3B085C9AB24}">
+                <p16:designElem xmlns:p16="http://schemas.microsoft.com/office/powerpoint/2015/main" val="1"/>
+              </p:ext>
+            </p:extLst>
+          </p:nvPr>
+        </p:nvSpPr>
+        <p:spPr>
+          <a:xfrm flipH="1">
+            <a:off x="7604080" y="6453143"/>
+            <a:ext cx="814903" cy="404857"/>
+          </a:xfrm>
+          <a:prstGeom prst="triangle">
+            <a:avLst/>
+          </a:prstGeom>
+          <a:solidFill>
+            <a:schemeClr val="accent1">
+              <a:alpha val="30000"/>
+            </a:schemeClr>
+          </a:solidFill>
+          <a:ln>
+            <a:noFill/>
+          </a:ln>
+        </p:spPr>
+        <p:style>
+          <a:lnRef idx="2">
+            <a:schemeClr val="accent1">
+              <a:shade val="50000"/>
+            </a:schemeClr>
+          </a:lnRef>
+          <a:fillRef idx="1">
+            <a:schemeClr val="accent1"/>
+          </a:fillRef>
+          <a:effectRef idx="0">
+            <a:schemeClr val="accent1"/>
+          </a:effectRef>
+          <a:fontRef idx="minor">
+            <a:schemeClr val="lt1"/>
+          </a:fontRef>
+        </p:style>
+        <p:txBody>
+          <a:bodyPr rtlCol="0" anchor="ctr"/>
+          <a:lstStyle/>
+          <a:p>
+            <a:pPr algn="ctr"/>
+            <a:endParaRPr lang="en-US"/>
+          </a:p>
+        </p:txBody>
+      </p:sp>
+    </p:spTree>
+    <p:extLst>
+      <p:ext uri="{BB962C8B-B14F-4D97-AF65-F5344CB8AC3E}">
+        <p14:creationId xmlns:p14="http://schemas.microsoft.com/office/powerpoint/2010/main" val="603778015"/>
       </p:ext>
     </p:extLst>
   </p:cSld>
@@ -3856,25 +4482,25 @@
           <a:p>
             <a:pPr algn="ctr"/>
             <a:r>
-              <a:rPr lang="en-US" sz="4400" b="1" dirty="0">
+              <a:rPr lang="en-US" sz="5400" b="1" dirty="0">
                 <a:solidFill>
                   <a:schemeClr val="tx1"/>
                 </a:solidFill>
               </a:rPr>
-              <a:t>Story #23</a:t>
+              <a:t>Story #22</a:t>
             </a:r>
           </a:p>
           <a:p>
             <a:pPr algn="ctr"/>
             <a:r>
-              <a:rPr lang="en-US" sz="4400" dirty="0">
+              <a:rPr lang="en-US" sz="5400" dirty="0">
                 <a:solidFill>
                   <a:schemeClr val="tx1"/>
                 </a:solidFill>
               </a:rPr>
-              <a:t>As a parent I want to book a meeting with a teacher so that I can get feedback on my child’s behavior and performance.</a:t>
-            </a:r>
-            <a:endParaRPr lang="fr-FR" sz="4400" dirty="0">
+              <a:t>As a parent I want to see the final grades of the term.</a:t>
+            </a:r>
+            <a:endParaRPr lang="fr-FR" sz="5400" dirty="0">
               <a:solidFill>
                 <a:schemeClr val="tx1"/>
               </a:solidFill>
@@ -3885,7 +4511,7 @@
     </p:spTree>
     <p:extLst>
       <p:ext uri="{BB962C8B-B14F-4D97-AF65-F5344CB8AC3E}">
-        <p14:creationId xmlns:p14="http://schemas.microsoft.com/office/powerpoint/2010/main" val="1908328511"/>
+        <p14:creationId xmlns:p14="http://schemas.microsoft.com/office/powerpoint/2010/main" val="3454268697"/>
       </p:ext>
     </p:extLst>
   </p:cSld>
@@ -3968,25 +4594,25 @@
           <a:p>
             <a:pPr algn="ctr"/>
             <a:r>
-              <a:rPr lang="en-US" sz="5400" b="1" dirty="0">
+              <a:rPr lang="en-US" sz="4400" b="1" dirty="0">
                 <a:solidFill>
                   <a:schemeClr val="tx1"/>
                 </a:solidFill>
               </a:rPr>
-              <a:t>Story #24</a:t>
+              <a:t>Story #23</a:t>
             </a:r>
           </a:p>
           <a:p>
             <a:pPr algn="ctr"/>
             <a:r>
-              <a:rPr lang="en-US" sz="5400" dirty="0">
+              <a:rPr lang="en-US" sz="4400" dirty="0">
                 <a:solidFill>
                   <a:schemeClr val="tx1"/>
                 </a:solidFill>
               </a:rPr>
-              <a:t>As an administrative officer I want to manage the teachers master data.</a:t>
-            </a:r>
-            <a:endParaRPr lang="fr-FR" sz="5400" dirty="0">
+              <a:t>As a parent I want to book a meeting with a teacher so that I can get feedback on my child’s behavior and performance.</a:t>
+            </a:r>
+            <a:endParaRPr lang="fr-FR" sz="4400" dirty="0">
               <a:solidFill>
                 <a:schemeClr val="tx1"/>
               </a:solidFill>
@@ -3997,7 +4623,7 @@
     </p:spTree>
     <p:extLst>
       <p:ext uri="{BB962C8B-B14F-4D97-AF65-F5344CB8AC3E}">
-        <p14:creationId xmlns:p14="http://schemas.microsoft.com/office/powerpoint/2010/main" val="3222264550"/>
+        <p14:creationId xmlns:p14="http://schemas.microsoft.com/office/powerpoint/2010/main" val="1908328511"/>
       </p:ext>
     </p:extLst>
   </p:cSld>
@@ -4085,7 +4711,7 @@
                   <a:schemeClr val="tx1"/>
                 </a:solidFill>
               </a:rPr>
-              <a:t>Story #25</a:t>
+              <a:t>Story #24</a:t>
             </a:r>
           </a:p>
           <a:p>
@@ -4096,7 +4722,7 @@
                   <a:schemeClr val="tx1"/>
                 </a:solidFill>
               </a:rPr>
-              <a:t>As a parent I want to see the timetables of the class.</a:t>
+              <a:t>As an administrative officer I want to manage the teachers master data.</a:t>
             </a:r>
             <a:endParaRPr lang="fr-FR" sz="5400" dirty="0">
               <a:solidFill>
@@ -4109,7 +4735,7 @@
     </p:spTree>
     <p:extLst>
       <p:ext uri="{BB962C8B-B14F-4D97-AF65-F5344CB8AC3E}">
-        <p14:creationId xmlns:p14="http://schemas.microsoft.com/office/powerpoint/2010/main" val="75230634"/>
+        <p14:creationId xmlns:p14="http://schemas.microsoft.com/office/powerpoint/2010/main" val="3222264550"/>
       </p:ext>
     </p:extLst>
   </p:cSld>
@@ -4192,25 +4818,25 @@
           <a:p>
             <a:pPr algn="ctr"/>
             <a:r>
-              <a:rPr lang="en-US" sz="4400" b="1" dirty="0">
+              <a:rPr lang="en-US" sz="5400" b="1" dirty="0">
                 <a:solidFill>
                   <a:schemeClr val="tx1"/>
                 </a:solidFill>
               </a:rPr>
-              <a:t>Story #26</a:t>
+              <a:t>Story #25</a:t>
             </a:r>
           </a:p>
           <a:p>
             <a:pPr algn="ctr"/>
             <a:r>
-              <a:rPr lang="en-US" sz="4400" dirty="0">
+              <a:rPr lang="en-US" sz="5400" dirty="0">
                 <a:solidFill>
                   <a:schemeClr val="tx1"/>
                 </a:solidFill>
               </a:rPr>
-              <a:t>As a parent I want to know the daily lecture topics so that I am informed about the progress of the lectures.</a:t>
-            </a:r>
-            <a:endParaRPr lang="fr-FR" sz="4400" dirty="0">
+              <a:t>As a parent I want to see the timetables of the class.</a:t>
+            </a:r>
+            <a:endParaRPr lang="fr-FR" sz="5400" dirty="0">
               <a:solidFill>
                 <a:schemeClr val="tx1"/>
               </a:solidFill>
@@ -4221,7 +4847,7 @@
     </p:spTree>
     <p:extLst>
       <p:ext uri="{BB962C8B-B14F-4D97-AF65-F5344CB8AC3E}">
-        <p14:creationId xmlns:p14="http://schemas.microsoft.com/office/powerpoint/2010/main" val="1600856455"/>
+        <p14:creationId xmlns:p14="http://schemas.microsoft.com/office/powerpoint/2010/main" val="75230634"/>
       </p:ext>
     </p:extLst>
   </p:cSld>
@@ -4304,25 +4930,25 @@
           <a:p>
             <a:pPr algn="ctr"/>
             <a:r>
-              <a:rPr lang="en-US" sz="4800" b="1" dirty="0">
+              <a:rPr lang="en-US" sz="4400" b="1" dirty="0">
                 <a:solidFill>
                   <a:schemeClr val="tx1"/>
                 </a:solidFill>
               </a:rPr>
-              <a:t>Story #28</a:t>
+              <a:t>Story #26</a:t>
             </a:r>
           </a:p>
           <a:p>
             <a:pPr algn="ctr"/>
             <a:r>
-              <a:rPr lang="en-US" sz="4800" dirty="0">
+              <a:rPr lang="en-US" sz="4400" dirty="0">
                 <a:solidFill>
                   <a:schemeClr val="tx1"/>
                 </a:solidFill>
               </a:rPr>
-              <a:t>As a teacher I want to check the timetables of the classes.</a:t>
-            </a:r>
-            <a:endParaRPr lang="fr-FR" sz="4800" dirty="0">
+              <a:t>As a parent I want to know the daily lecture topics so that I am informed about the progress of the lectures.</a:t>
+            </a:r>
+            <a:endParaRPr lang="fr-FR" sz="4400" dirty="0">
               <a:solidFill>
                 <a:schemeClr val="tx1"/>
               </a:solidFill>
@@ -4333,7 +4959,7 @@
     </p:spTree>
     <p:extLst>
       <p:ext uri="{BB962C8B-B14F-4D97-AF65-F5344CB8AC3E}">
-        <p14:creationId xmlns:p14="http://schemas.microsoft.com/office/powerpoint/2010/main" val="4089174198"/>
+        <p14:creationId xmlns:p14="http://schemas.microsoft.com/office/powerpoint/2010/main" val="1600856455"/>
       </p:ext>
     </p:extLst>
   </p:cSld>
@@ -4421,7 +5047,7 @@
                   <a:schemeClr val="tx1"/>
                 </a:solidFill>
               </a:rPr>
-              <a:t>Story #27 (not done)</a:t>
+              <a:t>Story #28</a:t>
             </a:r>
           </a:p>
           <a:p>
@@ -4432,7 +5058,7 @@
                   <a:schemeClr val="tx1"/>
                 </a:solidFill>
               </a:rPr>
-              <a:t>As an administrative officer I want to build the timetable of classes so that I can check all constraints are satisfied.</a:t>
+              <a:t>As a teacher I want to check the timetables of the classes.</a:t>
             </a:r>
             <a:endParaRPr lang="fr-FR" sz="4800" dirty="0">
               <a:solidFill>
@@ -4445,7 +5071,7 @@
     </p:spTree>
     <p:extLst>
       <p:ext uri="{BB962C8B-B14F-4D97-AF65-F5344CB8AC3E}">
-        <p14:creationId xmlns:p14="http://schemas.microsoft.com/office/powerpoint/2010/main" val="868173716"/>
+        <p14:creationId xmlns:p14="http://schemas.microsoft.com/office/powerpoint/2010/main" val="4089174198"/>
       </p:ext>
     </p:extLst>
   </p:cSld>

</xml_diff>